<commit_message>
Update Présentation Projet 2.pptx
</commit_message>
<xml_diff>
--- a/Présentation Projet 2.pptx
+++ b/Présentation Projet 2.pptx
@@ -109,6 +109,11 @@
       </a:defRPr>
     </a:lvl9pPr>
   </p:defaultTextStyle>
+  <p:extLst>
+    <p:ext uri="{EFAFB233-063F-42B5-8137-9DF3F51BA10A}">
+      <p15:sldGuideLst xmlns:p15="http://schemas.microsoft.com/office/powerpoint/2012/main"/>
+    </p:ext>
+  </p:extLst>
 </p:presentation>
 </file>
 
@@ -275,7 +280,7 @@
           <a:p>
             <a:fld id="{9AC3E1BF-7014-4215-A961-4601E5D41DE0}" type="datetimeFigureOut">
               <a:rPr lang="fr-FR" smtClean="0"/>
-              <a:t>19/11/2021</a:t>
+              <a:t>25/11/2021</a:t>
             </a:fld>
             <a:endParaRPr lang="fr-FR"/>
           </a:p>
@@ -445,7 +450,7 @@
           <a:p>
             <a:fld id="{9AC3E1BF-7014-4215-A961-4601E5D41DE0}" type="datetimeFigureOut">
               <a:rPr lang="fr-FR" smtClean="0"/>
-              <a:t>19/11/2021</a:t>
+              <a:t>25/11/2021</a:t>
             </a:fld>
             <a:endParaRPr lang="fr-FR"/>
           </a:p>
@@ -625,7 +630,7 @@
           <a:p>
             <a:fld id="{9AC3E1BF-7014-4215-A961-4601E5D41DE0}" type="datetimeFigureOut">
               <a:rPr lang="fr-FR" smtClean="0"/>
-              <a:t>19/11/2021</a:t>
+              <a:t>25/11/2021</a:t>
             </a:fld>
             <a:endParaRPr lang="fr-FR"/>
           </a:p>
@@ -795,7 +800,7 @@
           <a:p>
             <a:fld id="{9AC3E1BF-7014-4215-A961-4601E5D41DE0}" type="datetimeFigureOut">
               <a:rPr lang="fr-FR" smtClean="0"/>
-              <a:t>19/11/2021</a:t>
+              <a:t>25/11/2021</a:t>
             </a:fld>
             <a:endParaRPr lang="fr-FR"/>
           </a:p>
@@ -1063,7 +1068,7 @@
           <a:p>
             <a:fld id="{9AC3E1BF-7014-4215-A961-4601E5D41DE0}" type="datetimeFigureOut">
               <a:rPr lang="fr-FR" smtClean="0"/>
-              <a:t>19/11/2021</a:t>
+              <a:t>25/11/2021</a:t>
             </a:fld>
             <a:endParaRPr lang="fr-FR"/>
           </a:p>
@@ -1295,7 +1300,7 @@
           <a:p>
             <a:fld id="{9AC3E1BF-7014-4215-A961-4601E5D41DE0}" type="datetimeFigureOut">
               <a:rPr lang="fr-FR" smtClean="0"/>
-              <a:t>19/11/2021</a:t>
+              <a:t>25/11/2021</a:t>
             </a:fld>
             <a:endParaRPr lang="fr-FR"/>
           </a:p>
@@ -1659,7 +1664,7 @@
           <a:p>
             <a:fld id="{9AC3E1BF-7014-4215-A961-4601E5D41DE0}" type="datetimeFigureOut">
               <a:rPr lang="fr-FR" smtClean="0"/>
-              <a:t>19/11/2021</a:t>
+              <a:t>25/11/2021</a:t>
             </a:fld>
             <a:endParaRPr lang="fr-FR"/>
           </a:p>
@@ -1800,7 +1805,7 @@
           <a:p>
             <a:fld id="{9AC3E1BF-7014-4215-A961-4601E5D41DE0}" type="datetimeFigureOut">
               <a:rPr lang="fr-FR" smtClean="0"/>
-              <a:t>19/11/2021</a:t>
+              <a:t>25/11/2021</a:t>
             </a:fld>
             <a:endParaRPr lang="fr-FR"/>
           </a:p>
@@ -1895,7 +1900,7 @@
           <a:p>
             <a:fld id="{9AC3E1BF-7014-4215-A961-4601E5D41DE0}" type="datetimeFigureOut">
               <a:rPr lang="fr-FR" smtClean="0"/>
-              <a:t>19/11/2021</a:t>
+              <a:t>25/11/2021</a:t>
             </a:fld>
             <a:endParaRPr lang="fr-FR"/>
           </a:p>
@@ -2252,7 +2257,7 @@
           <a:p>
             <a:fld id="{9AC3E1BF-7014-4215-A961-4601E5D41DE0}" type="datetimeFigureOut">
               <a:rPr lang="fr-FR" smtClean="0"/>
-              <a:t>19/11/2021</a:t>
+              <a:t>25/11/2021</a:t>
             </a:fld>
             <a:endParaRPr lang="fr-FR"/>
           </a:p>
@@ -2614,7 +2619,7 @@
           <a:p>
             <a:fld id="{9AC3E1BF-7014-4215-A961-4601E5D41DE0}" type="datetimeFigureOut">
               <a:rPr lang="fr-FR" smtClean="0"/>
-              <a:t>19/11/2021</a:t>
+              <a:t>25/11/2021</a:t>
             </a:fld>
             <a:endParaRPr lang="fr-FR"/>
           </a:p>
@@ -2856,7 +2861,7 @@
           <a:p>
             <a:fld id="{9AC3E1BF-7014-4215-A961-4601E5D41DE0}" type="datetimeFigureOut">
               <a:rPr lang="fr-FR" smtClean="0"/>
-              <a:t>19/11/2021</a:t>
+              <a:t>25/11/2021</a:t>
             </a:fld>
             <a:endParaRPr lang="fr-FR"/>
           </a:p>
@@ -3621,15 +3626,7 @@
           <a:p>
             <a:r>
               <a:rPr lang="fr-FR" sz="1600" dirty="0"/>
-              <a:t>	</a:t>
-            </a:r>
-            <a:r>
-              <a:rPr lang="fr-FR" sz="1600" dirty="0" err="1"/>
-              <a:t>imossible</a:t>
-            </a:r>
-            <a:r>
-              <a:rPr lang="fr-FR" sz="1600" dirty="0"/>
-              <a:t> de lire le fichier symptoms.txt</a:t>
+              <a:t>	impossible de lire le fichier symptoms.txt</a:t>
             </a:r>
           </a:p>
           <a:p>
@@ -3691,7 +3688,7 @@
             <a:pPr lvl="1"/>
             <a:r>
               <a:rPr lang="fr-FR" sz="1600" dirty="0"/>
-              <a:t>ajout SYSO pour vérifier le comptage</a:t>
+              <a:t>ajout SYSOUT pour vérifier le comptage</a:t>
             </a:r>
           </a:p>
           <a:p>
@@ -3796,7 +3793,7 @@
             <a:pPr lvl="1"/>
             <a:r>
               <a:rPr lang="fr-FR" sz="1600" dirty="0"/>
-              <a:t>ajout SYSO pour vérifier le comptage</a:t>
+              <a:t>ajout SYSOUT pour vérifier le comptage</a:t>
             </a:r>
           </a:p>
           <a:p>
@@ -3931,15 +3928,7 @@
             </a:r>
             <a:r>
               <a:rPr lang="fr-FR" sz="1600" dirty="0"/>
-              <a:t> en doublon </a:t>
-            </a:r>
-            <a:r>
-              <a:rPr lang="fr-FR" sz="1600" dirty="0" err="1"/>
-              <a:t>ed</a:t>
-            </a:r>
-            <a:r>
-              <a:rPr lang="fr-FR" sz="1600" dirty="0"/>
-              <a:t> la variable </a:t>
+              <a:t> en doublon de la variable </a:t>
             </a:r>
             <a:r>
               <a:rPr lang="fr-FR" sz="1600" dirty="0" err="1"/>
@@ -3962,12 +3951,8 @@
           <a:p>
             <a:pPr lvl="1"/>
             <a:r>
-              <a:rPr lang="fr-FR" sz="1600" dirty="0" err="1"/>
-              <a:t>suprtession</a:t>
-            </a:r>
-            <a:r>
               <a:rPr lang="fr-FR" sz="1600" dirty="0"/>
-              <a:t> variable </a:t>
+              <a:t>suppression variable </a:t>
             </a:r>
             <a:r>
               <a:rPr lang="fr-FR" sz="1600" dirty="0" err="1"/>
@@ -4154,15 +4139,7 @@
             <a:pPr lvl="1"/>
             <a:r>
               <a:rPr lang="fr-FR" sz="1600" dirty="0"/>
-              <a:t>Après le </a:t>
-            </a:r>
-            <a:r>
-              <a:rPr lang="fr-FR" sz="1600" dirty="0" err="1"/>
-              <a:t>débuggage</a:t>
-            </a:r>
-            <a:r>
-              <a:rPr lang="fr-FR" sz="1600" dirty="0"/>
-              <a:t> du programme, il apparait que la class </a:t>
+              <a:t>Après le débuggage du programme, il apparait que l’interface </a:t>
             </a:r>
             <a:r>
               <a:rPr lang="fr-FR" sz="1600" dirty="0" err="1"/>
@@ -4238,15 +4215,7 @@
             </a:r>
             <a:r>
               <a:rPr lang="fr-FR" sz="1600" dirty="0"/>
-              <a:t> on créer la méthode start dans l’</a:t>
-            </a:r>
-            <a:r>
-              <a:rPr lang="fr-FR" sz="1600" dirty="0" err="1"/>
-              <a:t>aquelle</a:t>
-            </a:r>
-            <a:r>
-              <a:rPr lang="fr-FR" sz="1600" dirty="0"/>
-              <a:t> on instancie la class </a:t>
+              <a:t> on créer la méthode start dans laquelle on instancie la class </a:t>
             </a:r>
             <a:r>
               <a:rPr lang="fr-FR" sz="1600" dirty="0" err="1"/>
@@ -4290,23 +4259,7 @@
             </a:r>
             <a:r>
               <a:rPr lang="fr-FR" sz="1600" dirty="0"/>
-              <a:t> qui permet d’enregistrer les occurrences en clé ,d’</a:t>
-            </a:r>
-            <a:r>
-              <a:rPr lang="fr-FR" sz="1600" dirty="0" err="1"/>
-              <a:t>implementer</a:t>
-            </a:r>
-            <a:r>
-              <a:rPr lang="fr-FR" sz="1600" dirty="0"/>
-              <a:t> les valeurs pour faire le comptage et de classer le tout par ordre </a:t>
-            </a:r>
-            <a:r>
-              <a:rPr lang="fr-FR" sz="1600" dirty="0" err="1"/>
-              <a:t>alphabetique</a:t>
-            </a:r>
-            <a:r>
-              <a:rPr lang="fr-FR" sz="1600" dirty="0"/>
-              <a:t>,</a:t>
+              <a:t> qui permet d’enregistrer les occurrences en clé, d’incrémenter les valeurs pour faire le comptage et de classer le tout par ordre alphabétique,</a:t>
             </a:r>
           </a:p>
         </p:txBody>

</xml_diff>